<commit_message>
[add] complete lecture 16 review
</commit_message>
<xml_diff>
--- a/SE-227/slides/CSE-16 Lock.pptx
+++ b/SE-227/slides/CSE-16 Lock.pptx
@@ -267,7 +267,7 @@
           <a:p>
             <a:fld id="{FD384E5B-0B7C-A143-A087-04B582FC4BEF}" type="datetimeFigureOut">
               <a:rPr kumimoji="1" lang="zh-CN" altLang="en-US" smtClean="0"/>
-              <a:t>2019/11/9</a:t>
+              <a:t>2019/12/29</a:t>
             </a:fld>
             <a:endParaRPr kumimoji="1" lang="zh-CN" altLang="en-US"/>
           </a:p>
@@ -432,7 +432,7 @@
           <a:p>
             <a:fld id="{A2D7DB94-E0DE-4F0F-A9B7-54654CD8C8B1}" type="datetimeFigureOut">
               <a:rPr lang="zh-CN" altLang="en-US" smtClean="0"/>
-              <a:t>2019/11/9</a:t>
+              <a:t>2019/12/29</a:t>
             </a:fld>
             <a:endParaRPr lang="zh-CN" altLang="en-US"/>
           </a:p>
@@ -1262,7 +1262,7 @@
           <a:p>
             <a:fld id="{66A7A40B-EA42-4A59-BDB5-85EFA65BC5FC}" type="datetimeFigureOut">
               <a:rPr lang="zh-CN" altLang="en-US" smtClean="0"/>
-              <a:t>2019/11/9</a:t>
+              <a:t>2019/12/29</a:t>
             </a:fld>
             <a:endParaRPr lang="zh-CN" altLang="en-US" dirty="0"/>
           </a:p>
@@ -1430,7 +1430,7 @@
           <a:p>
             <a:fld id="{66A7A40B-EA42-4A59-BDB5-85EFA65BC5FC}" type="datetimeFigureOut">
               <a:rPr lang="zh-CN" altLang="en-US" smtClean="0"/>
-              <a:t>2019/11/9</a:t>
+              <a:t>2019/12/29</a:t>
             </a:fld>
             <a:endParaRPr lang="zh-CN" altLang="en-US"/>
           </a:p>
@@ -1608,7 +1608,7 @@
           <a:p>
             <a:fld id="{66A7A40B-EA42-4A59-BDB5-85EFA65BC5FC}" type="datetimeFigureOut">
               <a:rPr lang="zh-CN" altLang="en-US" smtClean="0"/>
-              <a:t>2019/11/9</a:t>
+              <a:t>2019/12/29</a:t>
             </a:fld>
             <a:endParaRPr lang="zh-CN" altLang="en-US"/>
           </a:p>
@@ -1850,7 +1850,7 @@
           <a:p>
             <a:fld id="{66A7A40B-EA42-4A59-BDB5-85EFA65BC5FC}" type="datetimeFigureOut">
               <a:rPr lang="zh-CN" altLang="en-US" smtClean="0"/>
-              <a:t>2019/11/9</a:t>
+              <a:t>2019/12/29</a:t>
             </a:fld>
             <a:endParaRPr lang="zh-CN" altLang="en-US" dirty="0"/>
           </a:p>
@@ -2086,7 +2086,7 @@
           <a:p>
             <a:fld id="{66A7A40B-EA42-4A59-BDB5-85EFA65BC5FC}" type="datetimeFigureOut">
               <a:rPr lang="zh-CN" altLang="en-US" smtClean="0"/>
-              <a:t>2019/11/9</a:t>
+              <a:t>2019/12/29</a:t>
             </a:fld>
             <a:endParaRPr lang="zh-CN" altLang="en-US"/>
           </a:p>
@@ -2378,7 +2378,7 @@
           <a:p>
             <a:fld id="{66A7A40B-EA42-4A59-BDB5-85EFA65BC5FC}" type="datetimeFigureOut">
               <a:rPr lang="zh-CN" altLang="en-US" smtClean="0"/>
-              <a:t>2019/11/9</a:t>
+              <a:t>2019/12/29</a:t>
             </a:fld>
             <a:endParaRPr lang="zh-CN" altLang="en-US"/>
           </a:p>
@@ -2709,7 +2709,7 @@
           <a:p>
             <a:fld id="{66A7A40B-EA42-4A59-BDB5-85EFA65BC5FC}" type="datetimeFigureOut">
               <a:rPr lang="zh-CN" altLang="en-US" smtClean="0"/>
-              <a:t>2019/11/9</a:t>
+              <a:t>2019/12/29</a:t>
             </a:fld>
             <a:endParaRPr lang="zh-CN" altLang="en-US"/>
           </a:p>
@@ -3128,7 +3128,7 @@
           <a:p>
             <a:fld id="{66A7A40B-EA42-4A59-BDB5-85EFA65BC5FC}" type="datetimeFigureOut">
               <a:rPr lang="zh-CN" altLang="en-US" smtClean="0"/>
-              <a:t>2019/11/9</a:t>
+              <a:t>2019/12/29</a:t>
             </a:fld>
             <a:endParaRPr lang="zh-CN" altLang="en-US"/>
           </a:p>
@@ -3245,7 +3245,7 @@
           <a:p>
             <a:fld id="{66A7A40B-EA42-4A59-BDB5-85EFA65BC5FC}" type="datetimeFigureOut">
               <a:rPr lang="zh-CN" altLang="en-US" smtClean="0"/>
-              <a:t>2019/11/9</a:t>
+              <a:t>2019/12/29</a:t>
             </a:fld>
             <a:endParaRPr lang="zh-CN" altLang="en-US"/>
           </a:p>
@@ -3340,7 +3340,7 @@
           <a:p>
             <a:fld id="{66A7A40B-EA42-4A59-BDB5-85EFA65BC5FC}" type="datetimeFigureOut">
               <a:rPr lang="zh-CN" altLang="en-US" smtClean="0"/>
-              <a:t>2019/11/9</a:t>
+              <a:t>2019/12/29</a:t>
             </a:fld>
             <a:endParaRPr lang="zh-CN" altLang="en-US"/>
           </a:p>
@@ -3615,7 +3615,7 @@
           <a:p>
             <a:fld id="{66A7A40B-EA42-4A59-BDB5-85EFA65BC5FC}" type="datetimeFigureOut">
               <a:rPr lang="zh-CN" altLang="en-US" smtClean="0"/>
-              <a:t>2019/11/9</a:t>
+              <a:t>2019/12/29</a:t>
             </a:fld>
             <a:endParaRPr lang="zh-CN" altLang="en-US"/>
           </a:p>
@@ -3851,7 +3851,7 @@
           <a:p>
             <a:fld id="{66A7A40B-EA42-4A59-BDB5-85EFA65BC5FC}" type="datetimeFigureOut">
               <a:rPr lang="zh-CN" altLang="en-US" smtClean="0"/>
-              <a:t>2019/11/9</a:t>
+              <a:t>2019/12/29</a:t>
             </a:fld>
             <a:endParaRPr lang="zh-CN" altLang="en-US"/>
           </a:p>
@@ -4152,7 +4152,7 @@
           <a:p>
             <a:fld id="{66A7A40B-EA42-4A59-BDB5-85EFA65BC5FC}" type="datetimeFigureOut">
               <a:rPr lang="zh-CN" altLang="en-US" smtClean="0"/>
-              <a:t>2019/11/9</a:t>
+              <a:t>2019/12/29</a:t>
             </a:fld>
             <a:endParaRPr lang="zh-CN" altLang="en-US"/>
           </a:p>
@@ -4320,7 +4320,7 @@
           <a:p>
             <a:fld id="{66A7A40B-EA42-4A59-BDB5-85EFA65BC5FC}" type="datetimeFigureOut">
               <a:rPr lang="zh-CN" altLang="en-US" smtClean="0"/>
-              <a:t>2019/11/9</a:t>
+              <a:t>2019/12/29</a:t>
             </a:fld>
             <a:endParaRPr lang="zh-CN" altLang="en-US"/>
           </a:p>
@@ -4498,7 +4498,7 @@
           <a:p>
             <a:fld id="{66A7A40B-EA42-4A59-BDB5-85EFA65BC5FC}" type="datetimeFigureOut">
               <a:rPr lang="zh-CN" altLang="en-US" smtClean="0"/>
-              <a:t>2019/11/9</a:t>
+              <a:t>2019/12/29</a:t>
             </a:fld>
             <a:endParaRPr lang="zh-CN" altLang="en-US"/>
           </a:p>
@@ -4744,7 +4744,7 @@
           <a:p>
             <a:fld id="{66A7A40B-EA42-4A59-BDB5-85EFA65BC5FC}" type="datetimeFigureOut">
               <a:rPr lang="zh-CN" altLang="en-US" smtClean="0"/>
-              <a:t>2019/11/9</a:t>
+              <a:t>2019/12/29</a:t>
             </a:fld>
             <a:endParaRPr lang="zh-CN" altLang="en-US"/>
           </a:p>
@@ -5075,7 +5075,7 @@
           <a:p>
             <a:fld id="{66A7A40B-EA42-4A59-BDB5-85EFA65BC5FC}" type="datetimeFigureOut">
               <a:rPr lang="zh-CN" altLang="en-US" smtClean="0"/>
-              <a:t>2019/11/9</a:t>
+              <a:t>2019/12/29</a:t>
             </a:fld>
             <a:endParaRPr lang="zh-CN" altLang="en-US"/>
           </a:p>
@@ -5494,7 +5494,7 @@
           <a:p>
             <a:fld id="{66A7A40B-EA42-4A59-BDB5-85EFA65BC5FC}" type="datetimeFigureOut">
               <a:rPr lang="zh-CN" altLang="en-US" smtClean="0"/>
-              <a:t>2019/11/9</a:t>
+              <a:t>2019/12/29</a:t>
             </a:fld>
             <a:endParaRPr lang="zh-CN" altLang="en-US"/>
           </a:p>
@@ -5611,7 +5611,7 @@
           <a:p>
             <a:fld id="{66A7A40B-EA42-4A59-BDB5-85EFA65BC5FC}" type="datetimeFigureOut">
               <a:rPr lang="zh-CN" altLang="en-US" smtClean="0"/>
-              <a:t>2019/11/9</a:t>
+              <a:t>2019/12/29</a:t>
             </a:fld>
             <a:endParaRPr lang="zh-CN" altLang="en-US"/>
           </a:p>
@@ -5706,7 +5706,7 @@
           <a:p>
             <a:fld id="{66A7A40B-EA42-4A59-BDB5-85EFA65BC5FC}" type="datetimeFigureOut">
               <a:rPr lang="zh-CN" altLang="en-US" smtClean="0"/>
-              <a:t>2019/11/9</a:t>
+              <a:t>2019/12/29</a:t>
             </a:fld>
             <a:endParaRPr lang="zh-CN" altLang="en-US"/>
           </a:p>
@@ -5981,7 +5981,7 @@
           <a:p>
             <a:fld id="{66A7A40B-EA42-4A59-BDB5-85EFA65BC5FC}" type="datetimeFigureOut">
               <a:rPr lang="zh-CN" altLang="en-US" smtClean="0"/>
-              <a:t>2019/11/9</a:t>
+              <a:t>2019/12/29</a:t>
             </a:fld>
             <a:endParaRPr lang="zh-CN" altLang="en-US"/>
           </a:p>
@@ -6236,7 +6236,7 @@
           <a:p>
             <a:fld id="{66A7A40B-EA42-4A59-BDB5-85EFA65BC5FC}" type="datetimeFigureOut">
               <a:rPr lang="zh-CN" altLang="en-US" smtClean="0"/>
-              <a:t>2019/11/9</a:t>
+              <a:t>2019/12/29</a:t>
             </a:fld>
             <a:endParaRPr lang="zh-CN" altLang="en-US"/>
           </a:p>
@@ -6451,7 +6451,7 @@
             <a:fld id="{66A7A40B-EA42-4A59-BDB5-85EFA65BC5FC}" type="datetimeFigureOut">
               <a:rPr lang="zh-CN" altLang="en-US" smtClean="0"/>
               <a:pPr/>
-              <a:t>2019/11/9</a:t>
+              <a:t>2019/12/29</a:t>
             </a:fld>
             <a:endParaRPr lang="zh-CN" altLang="en-US" dirty="0"/>
           </a:p>
@@ -7003,7 +7003,7 @@
             <a:fld id="{66A7A40B-EA42-4A59-BDB5-85EFA65BC5FC}" type="datetimeFigureOut">
               <a:rPr lang="zh-CN" altLang="en-US" smtClean="0"/>
               <a:pPr/>
-              <a:t>2019/11/9</a:t>
+              <a:t>2019/12/29</a:t>
             </a:fld>
             <a:endParaRPr lang="zh-CN" altLang="en-US" dirty="0"/>
           </a:p>
@@ -7718,7 +7718,7 @@
           <a:noFill/>
           <a:extLst>
             <a:ext uri="{909E8E84-426E-40dd-AFC4-6F175D3DCCD1}">
-              <a14:hiddenFill xmlns="" xmlns:a14="http://schemas.microsoft.com/office/drawing/2010/main">
+              <a14:hiddenFill xmlns:a14="http://schemas.microsoft.com/office/drawing/2010/main" xmlns="">
                 <a:solidFill>
                   <a:srgbClr val="FFFFFF"/>
                 </a:solidFill>
@@ -19091,14 +19091,14 @@
           <a:ln/>
           <a:extLst>
             <a:ext uri="{909E8E84-426E-40dd-AFC4-6F175D3DCCD1}">
-              <a14:hiddenFill xmlns="" xmlns:a14="http://schemas.microsoft.com/office/drawing/2010/main">
+              <a14:hiddenFill xmlns:a14="http://schemas.microsoft.com/office/drawing/2010/main" xmlns="">
                 <a:solidFill>
                   <a:srgbClr val="FFFFFF"/>
                 </a:solidFill>
               </a14:hiddenFill>
             </a:ext>
             <a:ext uri="{91240B29-F687-4f45-9708-019B960494DF}">
-              <a14:hiddenLine xmlns="" xmlns:a14="http://schemas.microsoft.com/office/drawing/2010/main" w="9525">
+              <a14:hiddenLine xmlns:a14="http://schemas.microsoft.com/office/drawing/2010/main" xmlns="" w="9525">
                 <a:solidFill>
                   <a:srgbClr val="000000"/>
                 </a:solidFill>
@@ -19384,14 +19384,14 @@
           <a:ln/>
           <a:extLst>
             <a:ext uri="{909E8E84-426E-40dd-AFC4-6F175D3DCCD1}">
-              <a14:hiddenFill xmlns="" xmlns:a14="http://schemas.microsoft.com/office/drawing/2010/main">
+              <a14:hiddenFill xmlns:a14="http://schemas.microsoft.com/office/drawing/2010/main" xmlns="">
                 <a:solidFill>
                   <a:srgbClr val="FFFFFF"/>
                 </a:solidFill>
               </a14:hiddenFill>
             </a:ext>
             <a:ext uri="{91240B29-F687-4f45-9708-019B960494DF}">
-              <a14:hiddenLine xmlns="" xmlns:a14="http://schemas.microsoft.com/office/drawing/2010/main" w="9525">
+              <a14:hiddenLine xmlns:a14="http://schemas.microsoft.com/office/drawing/2010/main" xmlns="" w="9525">
                 <a:solidFill>
                   <a:srgbClr val="000000"/>
                 </a:solidFill>
@@ -19697,14 +19697,14 @@
           <a:ln/>
           <a:extLst>
             <a:ext uri="{909E8E84-426E-40dd-AFC4-6F175D3DCCD1}">
-              <a14:hiddenFill xmlns="" xmlns:a14="http://schemas.microsoft.com/office/drawing/2010/main">
+              <a14:hiddenFill xmlns:a14="http://schemas.microsoft.com/office/drawing/2010/main" xmlns="">
                 <a:solidFill>
                   <a:srgbClr val="FFFFFF"/>
                 </a:solidFill>
               </a14:hiddenFill>
             </a:ext>
             <a:ext uri="{91240B29-F687-4f45-9708-019B960494DF}">
-              <a14:hiddenLine xmlns="" xmlns:a14="http://schemas.microsoft.com/office/drawing/2010/main" w="9525">
+              <a14:hiddenLine xmlns:a14="http://schemas.microsoft.com/office/drawing/2010/main" xmlns="" w="9525">
                 <a:solidFill>
                   <a:srgbClr val="000000"/>
                 </a:solidFill>
@@ -19925,14 +19925,14 @@
           <a:ln/>
           <a:extLst>
             <a:ext uri="{909E8E84-426E-40dd-AFC4-6F175D3DCCD1}">
-              <a14:hiddenFill xmlns="" xmlns:a14="http://schemas.microsoft.com/office/drawing/2010/main">
+              <a14:hiddenFill xmlns:a14="http://schemas.microsoft.com/office/drawing/2010/main" xmlns="">
                 <a:solidFill>
                   <a:srgbClr val="FFFFFF"/>
                 </a:solidFill>
               </a14:hiddenFill>
             </a:ext>
             <a:ext uri="{91240B29-F687-4f45-9708-019B960494DF}">
-              <a14:hiddenLine xmlns="" xmlns:a14="http://schemas.microsoft.com/office/drawing/2010/main" w="9525">
+              <a14:hiddenLine xmlns:a14="http://schemas.microsoft.com/office/drawing/2010/main" xmlns="" w="9525">
                 <a:solidFill>
                   <a:srgbClr val="000000"/>
                 </a:solidFill>
@@ -20432,7 +20432,7 @@
           </a:effectLst>
           <a:extLst>
             <a:ext uri="{909E8E84-426E-40dd-AFC4-6F175D3DCCD1}">
-              <a14:hiddenFill xmlns="" xmlns:a14="http://schemas.microsoft.com/office/drawing/2010/main">
+              <a14:hiddenFill xmlns:a14="http://schemas.microsoft.com/office/drawing/2010/main" xmlns="">
                 <a:noFill/>
               </a14:hiddenFill>
             </a:ext>
@@ -20473,7 +20473,7 @@
           </a:effectLst>
           <a:extLst>
             <a:ext uri="{909E8E84-426E-40dd-AFC4-6F175D3DCCD1}">
-              <a14:hiddenFill xmlns="" xmlns:a14="http://schemas.microsoft.com/office/drawing/2010/main">
+              <a14:hiddenFill xmlns:a14="http://schemas.microsoft.com/office/drawing/2010/main" xmlns="">
                 <a:noFill/>
               </a14:hiddenFill>
             </a:ext>
@@ -20514,7 +20514,7 @@
           </a:effectLst>
           <a:extLst>
             <a:ext uri="{909E8E84-426E-40dd-AFC4-6F175D3DCCD1}">
-              <a14:hiddenFill xmlns="" xmlns:a14="http://schemas.microsoft.com/office/drawing/2010/main">
+              <a14:hiddenFill xmlns:a14="http://schemas.microsoft.com/office/drawing/2010/main" xmlns="">
                 <a:noFill/>
               </a14:hiddenFill>
             </a:ext>
@@ -20555,7 +20555,7 @@
           </a:effectLst>
           <a:extLst>
             <a:ext uri="{909E8E84-426E-40dd-AFC4-6F175D3DCCD1}">
-              <a14:hiddenFill xmlns="" xmlns:a14="http://schemas.microsoft.com/office/drawing/2010/main">
+              <a14:hiddenFill xmlns:a14="http://schemas.microsoft.com/office/drawing/2010/main" xmlns="">
                 <a:noFill/>
               </a14:hiddenFill>
             </a:ext>
@@ -20596,7 +20596,7 @@
           </a:effectLst>
           <a:extLst>
             <a:ext uri="{909E8E84-426E-40dd-AFC4-6F175D3DCCD1}">
-              <a14:hiddenFill xmlns="" xmlns:a14="http://schemas.microsoft.com/office/drawing/2010/main">
+              <a14:hiddenFill xmlns:a14="http://schemas.microsoft.com/office/drawing/2010/main" xmlns="">
                 <a:noFill/>
               </a14:hiddenFill>
             </a:ext>
@@ -20637,7 +20637,7 @@
           </a:effectLst>
           <a:extLst>
             <a:ext uri="{909E8E84-426E-40dd-AFC4-6F175D3DCCD1}">
-              <a14:hiddenFill xmlns="" xmlns:a14="http://schemas.microsoft.com/office/drawing/2010/main">
+              <a14:hiddenFill xmlns:a14="http://schemas.microsoft.com/office/drawing/2010/main" xmlns="">
                 <a:noFill/>
               </a14:hiddenFill>
             </a:ext>
@@ -20678,7 +20678,7 @@
           </a:effectLst>
           <a:extLst>
             <a:ext uri="{909E8E84-426E-40dd-AFC4-6F175D3DCCD1}">
-              <a14:hiddenFill xmlns="" xmlns:a14="http://schemas.microsoft.com/office/drawing/2010/main">
+              <a14:hiddenFill xmlns:a14="http://schemas.microsoft.com/office/drawing/2010/main" xmlns="">
                 <a:noFill/>
               </a14:hiddenFill>
             </a:ext>
@@ -20719,7 +20719,7 @@
           </a:effectLst>
           <a:extLst>
             <a:ext uri="{909E8E84-426E-40dd-AFC4-6F175D3DCCD1}">
-              <a14:hiddenFill xmlns="" xmlns:a14="http://schemas.microsoft.com/office/drawing/2010/main">
+              <a14:hiddenFill xmlns:a14="http://schemas.microsoft.com/office/drawing/2010/main" xmlns="">
                 <a:noFill/>
               </a14:hiddenFill>
             </a:ext>
@@ -20760,7 +20760,7 @@
           </a:effectLst>
           <a:extLst>
             <a:ext uri="{909E8E84-426E-40dd-AFC4-6F175D3DCCD1}">
-              <a14:hiddenFill xmlns="" xmlns:a14="http://schemas.microsoft.com/office/drawing/2010/main">
+              <a14:hiddenFill xmlns:a14="http://schemas.microsoft.com/office/drawing/2010/main" xmlns="">
                 <a:noFill/>
               </a14:hiddenFill>
             </a:ext>
@@ -20801,7 +20801,7 @@
           </a:effectLst>
           <a:extLst>
             <a:ext uri="{909E8E84-426E-40dd-AFC4-6F175D3DCCD1}">
-              <a14:hiddenFill xmlns="" xmlns:a14="http://schemas.microsoft.com/office/drawing/2010/main">
+              <a14:hiddenFill xmlns:a14="http://schemas.microsoft.com/office/drawing/2010/main" xmlns="">
                 <a:noFill/>
               </a14:hiddenFill>
             </a:ext>
@@ -20842,7 +20842,7 @@
           </a:effectLst>
           <a:extLst>
             <a:ext uri="{909E8E84-426E-40dd-AFC4-6F175D3DCCD1}">
-              <a14:hiddenFill xmlns="" xmlns:a14="http://schemas.microsoft.com/office/drawing/2010/main">
+              <a14:hiddenFill xmlns:a14="http://schemas.microsoft.com/office/drawing/2010/main" xmlns="">
                 <a:noFill/>
               </a14:hiddenFill>
             </a:ext>
@@ -20883,7 +20883,7 @@
           </a:effectLst>
           <a:extLst>
             <a:ext uri="{909E8E84-426E-40dd-AFC4-6F175D3DCCD1}">
-              <a14:hiddenFill xmlns="" xmlns:a14="http://schemas.microsoft.com/office/drawing/2010/main">
+              <a14:hiddenFill xmlns:a14="http://schemas.microsoft.com/office/drawing/2010/main" xmlns="">
                 <a:noFill/>
               </a14:hiddenFill>
             </a:ext>
@@ -20924,7 +20924,7 @@
           </a:effectLst>
           <a:extLst>
             <a:ext uri="{909E8E84-426E-40dd-AFC4-6F175D3DCCD1}">
-              <a14:hiddenFill xmlns="" xmlns:a14="http://schemas.microsoft.com/office/drawing/2010/main">
+              <a14:hiddenFill xmlns:a14="http://schemas.microsoft.com/office/drawing/2010/main" xmlns="">
                 <a:noFill/>
               </a14:hiddenFill>
             </a:ext>
@@ -21074,7 +21074,7 @@
           </a:effectLst>
           <a:extLst>
             <a:ext uri="{909E8E84-426E-40dd-AFC4-6F175D3DCCD1}">
-              <a14:hiddenFill xmlns="" xmlns:a14="http://schemas.microsoft.com/office/drawing/2010/main">
+              <a14:hiddenFill xmlns:a14="http://schemas.microsoft.com/office/drawing/2010/main" xmlns="">
                 <a:noFill/>
               </a14:hiddenFill>
             </a:ext>
@@ -21116,7 +21116,7 @@
           </a:effectLst>
           <a:extLst>
             <a:ext uri="{909E8E84-426E-40dd-AFC4-6F175D3DCCD1}">
-              <a14:hiddenFill xmlns="" xmlns:a14="http://schemas.microsoft.com/office/drawing/2010/main">
+              <a14:hiddenFill xmlns:a14="http://schemas.microsoft.com/office/drawing/2010/main" xmlns="">
                 <a:noFill/>
               </a14:hiddenFill>
             </a:ext>
@@ -21392,14 +21392,14 @@
           </a:ln>
           <a:extLst>
             <a:ext uri="{909E8E84-426E-40dd-AFC4-6F175D3DCCD1}">
-              <a14:hiddenFill xmlns="" xmlns:a14="http://schemas.microsoft.com/office/drawing/2010/main">
+              <a14:hiddenFill xmlns:a14="http://schemas.microsoft.com/office/drawing/2010/main" xmlns="">
                 <a:solidFill>
                   <a:srgbClr val="FFFFFF"/>
                 </a:solidFill>
               </a14:hiddenFill>
             </a:ext>
             <a:ext uri="{91240B29-F687-4f45-9708-019B960494DF}">
-              <a14:hiddenLine xmlns="" xmlns:a14="http://schemas.microsoft.com/office/drawing/2010/main" w="9525">
+              <a14:hiddenLine xmlns:a14="http://schemas.microsoft.com/office/drawing/2010/main" xmlns="" w="9525">
                 <a:solidFill>
                   <a:srgbClr val="000000"/>
                 </a:solidFill>
@@ -21446,14 +21446,14 @@
           </a:ln>
           <a:extLst>
             <a:ext uri="{909E8E84-426E-40dd-AFC4-6F175D3DCCD1}">
-              <a14:hiddenFill xmlns="" xmlns:a14="http://schemas.microsoft.com/office/drawing/2010/main">
+              <a14:hiddenFill xmlns:a14="http://schemas.microsoft.com/office/drawing/2010/main" xmlns="">
                 <a:solidFill>
                   <a:srgbClr val="FFFFFF"/>
                 </a:solidFill>
               </a14:hiddenFill>
             </a:ext>
             <a:ext uri="{91240B29-F687-4f45-9708-019B960494DF}">
-              <a14:hiddenLine xmlns="" xmlns:a14="http://schemas.microsoft.com/office/drawing/2010/main" w="9525">
+              <a14:hiddenLine xmlns:a14="http://schemas.microsoft.com/office/drawing/2010/main" xmlns="" w="9525">
                 <a:solidFill>
                   <a:srgbClr val="000000"/>
                 </a:solidFill>
@@ -23888,14 +23888,14 @@
           <a:ln/>
           <a:extLst>
             <a:ext uri="{909E8E84-426E-40dd-AFC4-6F175D3DCCD1}">
-              <a14:hiddenFill xmlns="" xmlns:a14="http://schemas.microsoft.com/office/drawing/2010/main">
+              <a14:hiddenFill xmlns:a14="http://schemas.microsoft.com/office/drawing/2010/main" xmlns="">
                 <a:solidFill>
                   <a:srgbClr val="FFFFFF"/>
                 </a:solidFill>
               </a14:hiddenFill>
             </a:ext>
             <a:ext uri="{91240B29-F687-4f45-9708-019B960494DF}">
-              <a14:hiddenLine xmlns="" xmlns:a14="http://schemas.microsoft.com/office/drawing/2010/main" w="9525">
+              <a14:hiddenLine xmlns:a14="http://schemas.microsoft.com/office/drawing/2010/main" xmlns="" w="9525">
                 <a:solidFill>
                   <a:srgbClr val="000000"/>
                 </a:solidFill>
@@ -24133,14 +24133,14 @@
           <a:ln/>
           <a:extLst>
             <a:ext uri="{909E8E84-426E-40dd-AFC4-6F175D3DCCD1}">
-              <a14:hiddenFill xmlns="" xmlns:a14="http://schemas.microsoft.com/office/drawing/2010/main">
+              <a14:hiddenFill xmlns:a14="http://schemas.microsoft.com/office/drawing/2010/main" xmlns="">
                 <a:solidFill>
                   <a:srgbClr val="FFFFFF"/>
                 </a:solidFill>
               </a14:hiddenFill>
             </a:ext>
             <a:ext uri="{91240B29-F687-4f45-9708-019B960494DF}">
-              <a14:hiddenLine xmlns="" xmlns:a14="http://schemas.microsoft.com/office/drawing/2010/main" w="9525">
+              <a14:hiddenLine xmlns:a14="http://schemas.microsoft.com/office/drawing/2010/main" xmlns="" w="9525">
                 <a:solidFill>
                   <a:srgbClr val="000000"/>
                 </a:solidFill>
@@ -24322,14 +24322,14 @@
           </a:ln>
           <a:extLst>
             <a:ext uri="{909E8E84-426E-40dd-AFC4-6F175D3DCCD1}">
-              <a14:hiddenFill xmlns="" xmlns:a14="http://schemas.microsoft.com/office/drawing/2010/main">
+              <a14:hiddenFill xmlns:a14="http://schemas.microsoft.com/office/drawing/2010/main" xmlns="">
                 <a:solidFill>
                   <a:srgbClr val="FFFFFF"/>
                 </a:solidFill>
               </a14:hiddenFill>
             </a:ext>
             <a:ext uri="{91240B29-F687-4f45-9708-019B960494DF}">
-              <a14:hiddenLine xmlns="" xmlns:a14="http://schemas.microsoft.com/office/drawing/2010/main" w="9525">
+              <a14:hiddenLine xmlns:a14="http://schemas.microsoft.com/office/drawing/2010/main" xmlns="" w="9525">
                 <a:solidFill>
                   <a:srgbClr val="000000"/>
                 </a:solidFill>
@@ -24438,7 +24438,7 @@
               <a:rPr lang="en-US" altLang="zh-CN" sz="2800" dirty="0">
                 <a:ea typeface="MS PGothic" charset="0"/>
               </a:rPr>
-              <a:t>Four necessary and sufficient conditions for deadlock</a:t>
+              <a:t>Four necessary and enough conditions for deadlock</a:t>
             </a:r>
           </a:p>
           <a:p>
@@ -24572,14 +24572,14 @@
           <a:ln/>
           <a:extLst>
             <a:ext uri="{909E8E84-426E-40dd-AFC4-6F175D3DCCD1}">
-              <a14:hiddenFill xmlns="" xmlns:a14="http://schemas.microsoft.com/office/drawing/2010/main">
+              <a14:hiddenFill xmlns:a14="http://schemas.microsoft.com/office/drawing/2010/main" xmlns="">
                 <a:solidFill>
                   <a:srgbClr val="FFFFFF"/>
                 </a:solidFill>
               </a14:hiddenFill>
             </a:ext>
             <a:ext uri="{91240B29-F687-4f45-9708-019B960494DF}">
-              <a14:hiddenLine xmlns="" xmlns:a14="http://schemas.microsoft.com/office/drawing/2010/main" w="9525">
+              <a14:hiddenLine xmlns:a14="http://schemas.microsoft.com/office/drawing/2010/main" xmlns="" w="9525">
                 <a:solidFill>
                   <a:srgbClr val="000000"/>
                 </a:solidFill>
@@ -24893,14 +24893,14 @@
           <a:ln/>
           <a:extLst>
             <a:ext uri="{909E8E84-426E-40dd-AFC4-6F175D3DCCD1}">
-              <a14:hiddenFill xmlns="" xmlns:a14="http://schemas.microsoft.com/office/drawing/2010/main">
+              <a14:hiddenFill xmlns:a14="http://schemas.microsoft.com/office/drawing/2010/main" xmlns="">
                 <a:solidFill>
                   <a:srgbClr val="FFFFFF"/>
                 </a:solidFill>
               </a14:hiddenFill>
             </a:ext>
             <a:ext uri="{91240B29-F687-4f45-9708-019B960494DF}">
-              <a14:hiddenLine xmlns="" xmlns:a14="http://schemas.microsoft.com/office/drawing/2010/main" w="9525">
+              <a14:hiddenLine xmlns:a14="http://schemas.microsoft.com/office/drawing/2010/main" xmlns="" w="9525">
                 <a:solidFill>
                   <a:srgbClr val="000000"/>
                 </a:solidFill>
@@ -25174,14 +25174,14 @@
           <a:ln/>
           <a:extLst>
             <a:ext uri="{909E8E84-426E-40dd-AFC4-6F175D3DCCD1}">
-              <a14:hiddenFill xmlns="" xmlns:a14="http://schemas.microsoft.com/office/drawing/2010/main">
+              <a14:hiddenFill xmlns:a14="http://schemas.microsoft.com/office/drawing/2010/main" xmlns="">
                 <a:solidFill>
                   <a:srgbClr val="FFFFFF"/>
                 </a:solidFill>
               </a14:hiddenFill>
             </a:ext>
             <a:ext uri="{91240B29-F687-4f45-9708-019B960494DF}">
-              <a14:hiddenLine xmlns="" xmlns:a14="http://schemas.microsoft.com/office/drawing/2010/main" w="9525">
+              <a14:hiddenLine xmlns:a14="http://schemas.microsoft.com/office/drawing/2010/main" xmlns="" w="9525">
                 <a:solidFill>
                   <a:srgbClr val="000000"/>
                 </a:solidFill>
@@ -25467,14 +25467,14 @@
           <a:ln/>
           <a:extLst>
             <a:ext uri="{909E8E84-426E-40dd-AFC4-6F175D3DCCD1}">
-              <a14:hiddenFill xmlns="" xmlns:a14="http://schemas.microsoft.com/office/drawing/2010/main">
+              <a14:hiddenFill xmlns:a14="http://schemas.microsoft.com/office/drawing/2010/main" xmlns="">
                 <a:solidFill>
                   <a:srgbClr val="FFFFFF"/>
                 </a:solidFill>
               </a14:hiddenFill>
             </a:ext>
             <a:ext uri="{91240B29-F687-4f45-9708-019B960494DF}">
-              <a14:hiddenLine xmlns="" xmlns:a14="http://schemas.microsoft.com/office/drawing/2010/main" w="9525">
+              <a14:hiddenLine xmlns:a14="http://schemas.microsoft.com/office/drawing/2010/main" xmlns="" w="9525">
                 <a:solidFill>
                   <a:srgbClr val="000000"/>
                 </a:solidFill>
@@ -25693,14 +25693,14 @@
           <a:ln/>
           <a:extLst>
             <a:ext uri="{909E8E84-426E-40dd-AFC4-6F175D3DCCD1}">
-              <a14:hiddenFill xmlns="" xmlns:a14="http://schemas.microsoft.com/office/drawing/2010/main">
+              <a14:hiddenFill xmlns:a14="http://schemas.microsoft.com/office/drawing/2010/main" xmlns="">
                 <a:solidFill>
                   <a:srgbClr val="FFFFFF"/>
                 </a:solidFill>
               </a14:hiddenFill>
             </a:ext>
             <a:ext uri="{91240B29-F687-4f45-9708-019B960494DF}">
-              <a14:hiddenLine xmlns="" xmlns:a14="http://schemas.microsoft.com/office/drawing/2010/main" w="9525">
+              <a14:hiddenLine xmlns:a14="http://schemas.microsoft.com/office/drawing/2010/main" xmlns="" w="9525">
                 <a:solidFill>
                   <a:srgbClr val="000000"/>
                 </a:solidFill>
@@ -25882,14 +25882,14 @@
           </a:ln>
           <a:extLst>
             <a:ext uri="{909E8E84-426E-40dd-AFC4-6F175D3DCCD1}">
-              <a14:hiddenFill xmlns="" xmlns:a14="http://schemas.microsoft.com/office/drawing/2010/main">
+              <a14:hiddenFill xmlns:a14="http://schemas.microsoft.com/office/drawing/2010/main" xmlns="">
                 <a:solidFill>
                   <a:srgbClr val="FFFFFF"/>
                 </a:solidFill>
               </a14:hiddenFill>
             </a:ext>
             <a:ext uri="{91240B29-F687-4f45-9708-019B960494DF}">
-              <a14:hiddenLine xmlns="" xmlns:a14="http://schemas.microsoft.com/office/drawing/2010/main" w="9525">
+              <a14:hiddenLine xmlns:a14="http://schemas.microsoft.com/office/drawing/2010/main" xmlns="" w="9525">
                 <a:solidFill>
                   <a:srgbClr val="000000"/>
                 </a:solidFill>
@@ -26471,14 +26471,14 @@
           <a:ln/>
           <a:extLst>
             <a:ext uri="{909E8E84-426E-40dd-AFC4-6F175D3DCCD1}">
-              <a14:hiddenFill xmlns="" xmlns:a14="http://schemas.microsoft.com/office/drawing/2010/main">
+              <a14:hiddenFill xmlns:a14="http://schemas.microsoft.com/office/drawing/2010/main" xmlns="">
                 <a:solidFill>
                   <a:srgbClr val="FFFFFF"/>
                 </a:solidFill>
               </a14:hiddenFill>
             </a:ext>
             <a:ext uri="{91240B29-F687-4f45-9708-019B960494DF}">
-              <a14:hiddenLine xmlns="" xmlns:a14="http://schemas.microsoft.com/office/drawing/2010/main" w="9525">
+              <a14:hiddenLine xmlns:a14="http://schemas.microsoft.com/office/drawing/2010/main" xmlns="" w="9525">
                 <a:solidFill>
                   <a:srgbClr val="000000"/>
                 </a:solidFill>
@@ -26773,14 +26773,14 @@
           <a:ln/>
           <a:extLst>
             <a:ext uri="{909E8E84-426E-40dd-AFC4-6F175D3DCCD1}">
-              <a14:hiddenFill xmlns="" xmlns:a14="http://schemas.microsoft.com/office/drawing/2010/main">
+              <a14:hiddenFill xmlns:a14="http://schemas.microsoft.com/office/drawing/2010/main" xmlns="">
                 <a:solidFill>
                   <a:srgbClr val="FFFFFF"/>
                 </a:solidFill>
               </a14:hiddenFill>
             </a:ext>
             <a:ext uri="{91240B29-F687-4f45-9708-019B960494DF}">
-              <a14:hiddenLine xmlns="" xmlns:a14="http://schemas.microsoft.com/office/drawing/2010/main" w="9525">
+              <a14:hiddenLine xmlns:a14="http://schemas.microsoft.com/office/drawing/2010/main" xmlns="" w="9525">
                 <a:solidFill>
                   <a:srgbClr val="000000"/>
                 </a:solidFill>
@@ -27824,14 +27824,14 @@
           <a:ln/>
           <a:extLst>
             <a:ext uri="{909E8E84-426E-40dd-AFC4-6F175D3DCCD1}">
-              <a14:hiddenFill xmlns="" xmlns:a14="http://schemas.microsoft.com/office/drawing/2010/main">
+              <a14:hiddenFill xmlns:a14="http://schemas.microsoft.com/office/drawing/2010/main" xmlns="">
                 <a:solidFill>
                   <a:srgbClr val="FFFFFF"/>
                 </a:solidFill>
               </a14:hiddenFill>
             </a:ext>
             <a:ext uri="{91240B29-F687-4f45-9708-019B960494DF}">
-              <a14:hiddenLine xmlns="" xmlns:a14="http://schemas.microsoft.com/office/drawing/2010/main" w="9525">
+              <a14:hiddenLine xmlns:a14="http://schemas.microsoft.com/office/drawing/2010/main" xmlns="" w="9525">
                 <a:solidFill>
                   <a:srgbClr val="000000"/>
                 </a:solidFill>

</xml_diff>